<commit_message>
función movimiento pierna arriba.
Función sin comprobar y falta tmb colores.
</commit_message>
<xml_diff>
--- a/P1/presentación del jueves/presentación movimiento 15.pptx
+++ b/P1/presentación del jueves/presentación movimiento 15.pptx
@@ -255,7 +255,8 @@
           <a:p>
             <a:fld id="{D9ECFF66-97A8-479B-AF0C-A19AFF6B0E33}" type="datetimeFigureOut">
               <a:rPr lang="es-ES" smtClean="0"/>
-              <a:t>22/10/2014</a:t>
+              <a:pPr/>
+              <a:t>23/10/2014</a:t>
             </a:fld>
             <a:endParaRPr lang="es-ES"/>
           </a:p>
@@ -1001,6 +1002,7 @@
           <a:p>
             <a:fld id="{AC942A63-92CE-45EA-AF1F-821451FE9C65}" type="slidenum">
               <a:rPr lang="es-ES" smtClean="0"/>
+              <a:pPr/>
               <a:t>‹Nº›</a:t>
             </a:fld>
             <a:endParaRPr lang="es-ES"/>
@@ -1124,7 +1126,8 @@
           <a:p>
             <a:fld id="{D9ECFF66-97A8-479B-AF0C-A19AFF6B0E33}" type="datetimeFigureOut">
               <a:rPr lang="es-ES" smtClean="0"/>
-              <a:t>22/10/2014</a:t>
+              <a:pPr/>
+              <a:t>23/10/2014</a:t>
             </a:fld>
             <a:endParaRPr lang="es-ES"/>
           </a:p>
@@ -1166,6 +1169,7 @@
           <a:p>
             <a:fld id="{AC942A63-92CE-45EA-AF1F-821451FE9C65}" type="slidenum">
               <a:rPr lang="es-ES" smtClean="0"/>
+              <a:pPr/>
               <a:t>‹Nº›</a:t>
             </a:fld>
             <a:endParaRPr lang="es-ES"/>
@@ -1299,7 +1303,8 @@
           <a:p>
             <a:fld id="{D9ECFF66-97A8-479B-AF0C-A19AFF6B0E33}" type="datetimeFigureOut">
               <a:rPr lang="es-ES" smtClean="0"/>
-              <a:t>22/10/2014</a:t>
+              <a:pPr/>
+              <a:t>23/10/2014</a:t>
             </a:fld>
             <a:endParaRPr lang="es-ES"/>
           </a:p>
@@ -1341,6 +1346,7 @@
           <a:p>
             <a:fld id="{AC942A63-92CE-45EA-AF1F-821451FE9C65}" type="slidenum">
               <a:rPr lang="es-ES" smtClean="0"/>
+              <a:pPr/>
               <a:t>‹Nº›</a:t>
             </a:fld>
             <a:endParaRPr lang="es-ES"/>
@@ -1469,7 +1475,8 @@
           <a:p>
             <a:fld id="{D9ECFF66-97A8-479B-AF0C-A19AFF6B0E33}" type="datetimeFigureOut">
               <a:rPr lang="es-ES" smtClean="0"/>
-              <a:t>22/10/2014</a:t>
+              <a:pPr/>
+              <a:t>23/10/2014</a:t>
             </a:fld>
             <a:endParaRPr lang="es-ES"/>
           </a:p>
@@ -1492,6 +1499,7 @@
           <a:p>
             <a:fld id="{AC942A63-92CE-45EA-AF1F-821451FE9C65}" type="slidenum">
               <a:rPr lang="es-ES" smtClean="0"/>
+              <a:pPr/>
               <a:t>‹Nº›</a:t>
             </a:fld>
             <a:endParaRPr lang="es-ES"/>
@@ -1679,7 +1687,8 @@
           <a:p>
             <a:fld id="{D9ECFF66-97A8-479B-AF0C-A19AFF6B0E33}" type="datetimeFigureOut">
               <a:rPr lang="es-ES" smtClean="0"/>
-              <a:t>22/10/2014</a:t>
+              <a:pPr/>
+              <a:t>23/10/2014</a:t>
             </a:fld>
             <a:endParaRPr lang="es-ES"/>
           </a:p>
@@ -2422,6 +2431,7 @@
           <a:p>
             <a:fld id="{AC942A63-92CE-45EA-AF1F-821451FE9C65}" type="slidenum">
               <a:rPr lang="es-ES" smtClean="0"/>
+              <a:pPr/>
               <a:t>‹Nº›</a:t>
             </a:fld>
             <a:endParaRPr lang="es-ES"/>
@@ -2493,7 +2503,8 @@
           <a:p>
             <a:fld id="{D9ECFF66-97A8-479B-AF0C-A19AFF6B0E33}" type="datetimeFigureOut">
               <a:rPr lang="es-ES" smtClean="0"/>
-              <a:t>22/10/2014</a:t>
+              <a:pPr/>
+              <a:t>23/10/2014</a:t>
             </a:fld>
             <a:endParaRPr lang="es-ES"/>
           </a:p>
@@ -2535,6 +2546,7 @@
           <a:p>
             <a:fld id="{AC942A63-92CE-45EA-AF1F-821451FE9C65}" type="slidenum">
               <a:rPr lang="es-ES" smtClean="0"/>
+              <a:pPr/>
               <a:t>‹Nº›</a:t>
             </a:fld>
             <a:endParaRPr lang="es-ES"/>
@@ -2729,7 +2741,8 @@
           <a:p>
             <a:fld id="{D9ECFF66-97A8-479B-AF0C-A19AFF6B0E33}" type="datetimeFigureOut">
               <a:rPr lang="es-ES" smtClean="0"/>
-              <a:t>22/10/2014</a:t>
+              <a:pPr/>
+              <a:t>23/10/2014</a:t>
             </a:fld>
             <a:endParaRPr lang="es-ES"/>
           </a:p>
@@ -2771,6 +2784,7 @@
           <a:p>
             <a:fld id="{AC942A63-92CE-45EA-AF1F-821451FE9C65}" type="slidenum">
               <a:rPr lang="es-ES" smtClean="0"/>
+              <a:pPr/>
               <a:t>‹Nº›</a:t>
             </a:fld>
             <a:endParaRPr lang="es-ES"/>
@@ -3052,7 +3066,8 @@
           <a:p>
             <a:fld id="{D9ECFF66-97A8-479B-AF0C-A19AFF6B0E33}" type="datetimeFigureOut">
               <a:rPr lang="es-ES" smtClean="0"/>
-              <a:t>22/10/2014</a:t>
+              <a:pPr/>
+              <a:t>23/10/2014</a:t>
             </a:fld>
             <a:endParaRPr lang="es-ES"/>
           </a:p>
@@ -3075,6 +3090,7 @@
           <a:p>
             <a:fld id="{AC942A63-92CE-45EA-AF1F-821451FE9C65}" type="slidenum">
               <a:rPr lang="es-ES" smtClean="0"/>
+              <a:pPr/>
               <a:t>‹Nº›</a:t>
             </a:fld>
             <a:endParaRPr lang="es-ES"/>
@@ -3142,7 +3158,8 @@
           <a:p>
             <a:fld id="{D9ECFF66-97A8-479B-AF0C-A19AFF6B0E33}" type="datetimeFigureOut">
               <a:rPr lang="es-ES" smtClean="0"/>
-              <a:t>22/10/2014</a:t>
+              <a:pPr/>
+              <a:t>23/10/2014</a:t>
             </a:fld>
             <a:endParaRPr lang="es-ES"/>
           </a:p>
@@ -3184,6 +3201,7 @@
           <a:p>
             <a:fld id="{AC942A63-92CE-45EA-AF1F-821451FE9C65}" type="slidenum">
               <a:rPr lang="es-ES" smtClean="0"/>
+              <a:pPr/>
               <a:t>‹Nº›</a:t>
             </a:fld>
             <a:endParaRPr lang="es-ES"/>
@@ -3659,7 +3677,8 @@
           <a:p>
             <a:fld id="{D9ECFF66-97A8-479B-AF0C-A19AFF6B0E33}" type="datetimeFigureOut">
               <a:rPr lang="es-ES" smtClean="0"/>
-              <a:t>22/10/2014</a:t>
+              <a:pPr/>
+              <a:t>23/10/2014</a:t>
             </a:fld>
             <a:endParaRPr lang="es-ES"/>
           </a:p>
@@ -3682,6 +3701,7 @@
           <a:p>
             <a:fld id="{AC942A63-92CE-45EA-AF1F-821451FE9C65}" type="slidenum">
               <a:rPr lang="es-ES" smtClean="0"/>
+              <a:pPr/>
               <a:t>‹Nº›</a:t>
             </a:fld>
             <a:endParaRPr lang="es-ES"/>
@@ -4170,7 +4190,8 @@
           <a:p>
             <a:fld id="{D9ECFF66-97A8-479B-AF0C-A19AFF6B0E33}" type="datetimeFigureOut">
               <a:rPr lang="es-ES" smtClean="0"/>
-              <a:t>22/10/2014</a:t>
+              <a:pPr/>
+              <a:t>23/10/2014</a:t>
             </a:fld>
             <a:endParaRPr lang="es-ES"/>
           </a:p>
@@ -4193,6 +4214,7 @@
           <a:p>
             <a:fld id="{AC942A63-92CE-45EA-AF1F-821451FE9C65}" type="slidenum">
               <a:rPr lang="es-ES" smtClean="0"/>
+              <a:pPr/>
               <a:t>‹Nº›</a:t>
             </a:fld>
             <a:endParaRPr lang="es-ES"/>
@@ -4415,7 +4437,8 @@
           <a:p>
             <a:fld id="{D9ECFF66-97A8-479B-AF0C-A19AFF6B0E33}" type="datetimeFigureOut">
               <a:rPr lang="es-ES" smtClean="0"/>
-              <a:t>22/10/2014</a:t>
+              <a:pPr/>
+              <a:t>23/10/2014</a:t>
             </a:fld>
             <a:endParaRPr lang="es-ES"/>
           </a:p>
@@ -4691,6 +4714,7 @@
           <a:p>
             <a:fld id="{AC942A63-92CE-45EA-AF1F-821451FE9C65}" type="slidenum">
               <a:rPr lang="es-ES" smtClean="0"/>
+              <a:pPr/>
               <a:t>‹Nº›</a:t>
             </a:fld>
             <a:endParaRPr lang="es-ES"/>
@@ -5131,19 +5155,7 @@
             </a:br>
             <a:r>
               <a:rPr lang="es-ES" dirty="0" smtClean="0"/>
-              <a:t>La Flexión  de la pierna izquierda hacia atrás con un ángulo proporcionado </a:t>
-            </a:r>
-            <a:r>
-              <a:rPr lang="es-ES" dirty="0" smtClean="0"/>
-              <a:t>(</a:t>
-            </a:r>
-            <a:r>
-              <a:rPr lang="es-ES" dirty="0" smtClean="0"/>
-              <a:t>V</a:t>
-            </a:r>
-            <a:r>
-              <a:rPr lang="es-ES" dirty="0" smtClean="0"/>
-              <a:t>)</a:t>
+              <a:t>La Flexión  de la pierna izquierda hacia atrás con un ángulo proporcionado (V)</a:t>
             </a:r>
             <a:endParaRPr lang="es-ES" dirty="0"/>
           </a:p>
@@ -5207,7 +5219,6 @@
               <a:rPr lang="es-ES" dirty="0" smtClean="0"/>
               <a:t>Calculado a podemos saber cuanto sube el pie. Según el ángulo dado. </a:t>
             </a:r>
-            <a:endParaRPr lang="es-ES" dirty="0" smtClean="0"/>
           </a:p>
           <a:p>
             <a:endParaRPr lang="es-ES" dirty="0" smtClean="0"/>
@@ -5334,7 +5345,17 @@
           <a:p>
             <a:r>
               <a:rPr lang="es-ES" dirty="0" smtClean="0"/>
-              <a:t>Con respecto a la parte de brazos cruzados. </a:t>
+              <a:t>El plano espacial no es el que sale en el guión de prácticas.</a:t>
+            </a:r>
+          </a:p>
+          <a:p>
+            <a:r>
+              <a:rPr lang="es-ES" dirty="0" smtClean="0"/>
+              <a:t>Con </a:t>
+            </a:r>
+            <a:r>
+              <a:rPr lang="es-ES" dirty="0" smtClean="0"/>
+              <a:t>respecto a la parte de brazos cruzados. </a:t>
             </a:r>
           </a:p>
           <a:p>
@@ -5351,8 +5372,13 @@
           <a:p>
             <a:r>
               <a:rPr lang="es-ES" dirty="0" smtClean="0"/>
-              <a:t>Con respecto a la parte de pie hacia atrás-</a:t>
-            </a:r>
+              <a:t>Con respecto a la parte de pie hacia </a:t>
+            </a:r>
+            <a:r>
+              <a:rPr lang="es-ES" dirty="0" smtClean="0"/>
+              <a:t>atrás</a:t>
+            </a:r>
+            <a:endParaRPr lang="es-ES" dirty="0" smtClean="0"/>
           </a:p>
           <a:p>
             <a:pPr lvl="1"/>
@@ -5523,15 +5549,7 @@
             </a:pPr>
             <a:r>
               <a:rPr lang="es-ES" b="1" dirty="0" smtClean="0"/>
-              <a:t>Julio </a:t>
-            </a:r>
-            <a:r>
-              <a:rPr lang="es-ES" b="1" dirty="0" smtClean="0"/>
-              <a:t>Rodríguez </a:t>
-            </a:r>
-            <a:r>
-              <a:rPr lang="es-ES" b="1" dirty="0" smtClean="0"/>
-              <a:t>Martínez</a:t>
+              <a:t>Julio Rodríguez Martínez</a:t>
             </a:r>
             <a:r>
               <a:rPr lang="es-ES" dirty="0" smtClean="0"/>
@@ -5544,13 +5562,7 @@
               <a:rPr lang="es-ES" dirty="0" smtClean="0">
                 <a:hlinkClick r:id="rId3"/>
               </a:rPr>
-              <a:t>http</a:t>
-            </a:r>
-            <a:r>
-              <a:rPr lang="es-ES" dirty="0" smtClean="0">
-                <a:hlinkClick r:id="rId3"/>
-              </a:rPr>
-              <a:t>://vidaencuadro.blogspot.com.es/</a:t>
+              <a:t>http://vidaencuadro.blogspot.com.es/</a:t>
             </a:r>
             <a:r>
               <a:rPr lang="es-ES" dirty="0" smtClean="0"/>
@@ -5595,13 +5607,7 @@
               <a:rPr lang="es-ES" dirty="0" smtClean="0">
                 <a:hlinkClick r:id="rId6"/>
               </a:rPr>
-              <a:t>https</a:t>
-            </a:r>
-            <a:r>
-              <a:rPr lang="es-ES" dirty="0" smtClean="0">
-                <a:hlinkClick r:id="rId6"/>
-              </a:rPr>
-              <a:t>://github.com/Jick9536</a:t>
+              <a:t>https://github.com/Jick9536</a:t>
             </a:r>
             <a:endParaRPr lang="es-ES" dirty="0"/>
           </a:p>
@@ -5953,7 +5959,6 @@
               <a:rPr lang="es-ES" dirty="0" smtClean="0"/>
               <a:t> en dos movimientos. </a:t>
             </a:r>
-            <a:endParaRPr lang="es-ES" dirty="0" smtClean="0"/>
           </a:p>
           <a:p>
             <a:pPr lvl="1"/>
@@ -6123,11 +6128,7 @@
           <a:p>
             <a:r>
               <a:rPr lang="es-ES" dirty="0" smtClean="0"/>
-              <a:t>Resolución propuesta para detectar los brazos en </a:t>
-            </a:r>
-            <a:r>
-              <a:rPr lang="es-ES" dirty="0" smtClean="0"/>
-              <a:t>cruz (II) </a:t>
+              <a:t>Resolución propuesta para detectar los brazos en cruz (II) </a:t>
             </a:r>
             <a:endParaRPr lang="es-ES" dirty="0"/>
           </a:p>
@@ -6291,26 +6292,14 @@
           <a:p>
             <a:r>
               <a:rPr lang="es-ES" dirty="0" smtClean="0"/>
-              <a:t>Resolución propuesta para </a:t>
-            </a:r>
-            <a:r>
-              <a:rPr lang="es-ES" dirty="0" smtClean="0"/>
-              <a:t>detectar </a:t>
+              <a:t>Resolución propuesta para detectar </a:t>
             </a:r>
             <a:br>
               <a:rPr lang="es-ES" dirty="0" smtClean="0"/>
             </a:br>
             <a:r>
               <a:rPr lang="es-ES" dirty="0" smtClean="0"/>
-              <a:t>La Flexión  de la </a:t>
-            </a:r>
-            <a:r>
-              <a:rPr lang="es-ES" dirty="0" smtClean="0"/>
-              <a:t>pierna izquierda hacia atrás con un ángulo proporcionado</a:t>
-            </a:r>
-            <a:r>
-              <a:rPr lang="es-ES" dirty="0" smtClean="0"/>
-              <a:t> </a:t>
+              <a:t>La Flexión  de la pierna izquierda hacia atrás con un ángulo proporcionado </a:t>
             </a:r>
             <a:endParaRPr lang="es-ES" dirty="0"/>
           </a:p>
@@ -6412,26 +6401,14 @@
           <a:p>
             <a:r>
               <a:rPr lang="es-ES" dirty="0" smtClean="0"/>
-              <a:t>Resolución propuesta para </a:t>
-            </a:r>
-            <a:r>
-              <a:rPr lang="es-ES" dirty="0" smtClean="0"/>
-              <a:t>detectar </a:t>
+              <a:t>Resolución propuesta para detectar </a:t>
             </a:r>
             <a:br>
               <a:rPr lang="es-ES" dirty="0" smtClean="0"/>
             </a:br>
             <a:r>
               <a:rPr lang="es-ES" dirty="0" smtClean="0"/>
-              <a:t>La Flexión  de la </a:t>
-            </a:r>
-            <a:r>
-              <a:rPr lang="es-ES" dirty="0" smtClean="0"/>
-              <a:t>pierna izquierda hacia atrás con un ángulo proporcionado</a:t>
-            </a:r>
-            <a:r>
-              <a:rPr lang="es-ES" dirty="0" smtClean="0"/>
-              <a:t> (II)</a:t>
+              <a:t>La Flexión  de la pierna izquierda hacia atrás con un ángulo proporcionado (II)</a:t>
             </a:r>
             <a:endParaRPr lang="es-ES" dirty="0"/>
           </a:p>
@@ -6533,26 +6510,14 @@
           <a:p>
             <a:r>
               <a:rPr lang="es-ES" dirty="0" smtClean="0"/>
-              <a:t>Resolución propuesta para </a:t>
-            </a:r>
-            <a:r>
-              <a:rPr lang="es-ES" dirty="0" smtClean="0"/>
-              <a:t>detectar </a:t>
+              <a:t>Resolución propuesta para detectar </a:t>
             </a:r>
             <a:br>
               <a:rPr lang="es-ES" dirty="0" smtClean="0"/>
             </a:br>
             <a:r>
               <a:rPr lang="es-ES" dirty="0" smtClean="0"/>
-              <a:t>La Flexión  de la </a:t>
-            </a:r>
-            <a:r>
-              <a:rPr lang="es-ES" dirty="0" smtClean="0"/>
-              <a:t>pierna izquierda hacia atrás con un ángulo proporcionado</a:t>
-            </a:r>
-            <a:r>
-              <a:rPr lang="es-ES" dirty="0" smtClean="0"/>
-              <a:t> (III)</a:t>
+              <a:t>La Flexión  de la pierna izquierda hacia atrás con un ángulo proporcionado (III)</a:t>
             </a:r>
             <a:endParaRPr lang="es-ES" dirty="0"/>
           </a:p>
@@ -6628,26 +6593,14 @@
           <a:p>
             <a:r>
               <a:rPr lang="es-ES" dirty="0" smtClean="0"/>
-              <a:t>Resolución propuesta para </a:t>
-            </a:r>
-            <a:r>
-              <a:rPr lang="es-ES" dirty="0" smtClean="0"/>
-              <a:t>detectar </a:t>
+              <a:t>Resolución propuesta para detectar </a:t>
             </a:r>
             <a:br>
               <a:rPr lang="es-ES" dirty="0" smtClean="0"/>
             </a:br>
             <a:r>
               <a:rPr lang="es-ES" dirty="0" smtClean="0"/>
-              <a:t>La Flexión  de la </a:t>
-            </a:r>
-            <a:r>
-              <a:rPr lang="es-ES" dirty="0" smtClean="0"/>
-              <a:t>pierna izquierda hacia atrás con un ángulo proporcionado</a:t>
-            </a:r>
-            <a:r>
-              <a:rPr lang="es-ES" dirty="0" smtClean="0"/>
-              <a:t> (IV)</a:t>
+              <a:t>La Flexión  de la pierna izquierda hacia atrás con un ángulo proporcionado (IV)</a:t>
             </a:r>
             <a:endParaRPr lang="es-ES" dirty="0"/>
           </a:p>

</xml_diff>